<commit_message>
add: finish homework (#1)
</commit_message>
<xml_diff>
--- a/Homeworks/Homework_1/H1_Project/docs/Images.pptx
+++ b/Homeworks/Homework_1/H1_Project/docs/Images.pptx
@@ -9,7 +9,6 @@
     <p:sldId id="257" r:id="rId3"/>
     <p:sldId id="258" r:id="rId4"/>
     <p:sldId id="259" r:id="rId5"/>
-    <p:sldId id="260" r:id="rId6"/>
   </p:sldIdLst>
   <p:sldSz cx="12192000" cy="6858000"/>
   <p:notesSz cx="6858000" cy="9144000"/>
@@ -7636,7 +7635,7 @@
         </p:nvGrpSpPr>
         <p:grpSpPr>
           <a:xfrm>
-            <a:off x="-502024" y="-2850762"/>
+            <a:off x="-502024" y="-2075322"/>
             <a:ext cx="14110448" cy="11008643"/>
             <a:chOff x="-502024" y="-2850762"/>
             <a:chExt cx="14110448" cy="11008643"/>
@@ -15468,7 +15467,7 @@
                           </a:solidFill>
                           <a:effectLst/>
                         </a:rPr>
-                        <a:t>kScrooge_sk</a:t>
+                        <a:t>kAlice_sk</a:t>
                       </a:r>
                       <a:r>
                         <a:rPr lang="en-US" sz="900" dirty="0">
@@ -16244,7 +16243,7 @@
                           </a:solidFill>
                           <a:effectLst/>
                         </a:rPr>
-                        <a:t>kScrooge_sk</a:t>
+                        <a:t>kBob_sk</a:t>
                       </a:r>
                       <a:r>
                         <a:rPr lang="en-US" sz="900" dirty="0">
@@ -16987,10 +16986,10 @@
       </p:grpSpPr>
       <p:pic>
         <p:nvPicPr>
-          <p:cNvPr id="267" name="Picture 266">
+          <p:cNvPr id="2" name="Picture 1">
             <a:extLst>
               <a:ext uri="{FF2B5EF4-FFF2-40B4-BE49-F238E27FC236}">
-                <a16:creationId xmlns:a16="http://schemas.microsoft.com/office/drawing/2014/main" id="{7138B93C-C2B2-6C48-A886-0AFB589C9944}"/>
+                <a16:creationId xmlns:a16="http://schemas.microsoft.com/office/drawing/2014/main" id="{0C5B7227-2802-CA4A-A3DD-F2E18ED08166}"/>
               </a:ext>
             </a:extLst>
           </p:cNvPr>
@@ -17007,8 +17006,8 @@
         </p:blipFill>
         <p:spPr>
           <a:xfrm>
-            <a:off x="-99066063" y="-74912556"/>
-            <a:ext cx="191893372" cy="149825112"/>
+            <a:off x="-86084230" y="-68542809"/>
+            <a:ext cx="177001715" cy="138198112"/>
           </a:xfrm>
           <a:prstGeom prst="rect">
             <a:avLst/>
@@ -17019,66 +17018,6 @@
     <p:extLst>
       <p:ext uri="{BB962C8B-B14F-4D97-AF65-F5344CB8AC3E}">
         <p14:creationId xmlns:p14="http://schemas.microsoft.com/office/powerpoint/2010/main" val="3600675728"/>
-      </p:ext>
-    </p:extLst>
-  </p:cSld>
-  <p:clrMapOvr>
-    <a:masterClrMapping/>
-  </p:clrMapOvr>
-</p:sld>
-</file>
-
-<file path=ppt/slides/slide5.xml><?xml version="1.0" encoding="utf-8"?>
-<p:sld xmlns:a="http://schemas.openxmlformats.org/drawingml/2006/main" xmlns:r="http://schemas.openxmlformats.org/officeDocument/2006/relationships" xmlns:p="http://schemas.openxmlformats.org/presentationml/2006/main">
-  <p:cSld>
-    <p:spTree>
-      <p:nvGrpSpPr>
-        <p:cNvPr id="1" name=""/>
-        <p:cNvGrpSpPr/>
-        <p:nvPr/>
-      </p:nvGrpSpPr>
-      <p:grpSpPr>
-        <a:xfrm>
-          <a:off x="0" y="0"/>
-          <a:ext cx="0" cy="0"/>
-          <a:chOff x="0" y="0"/>
-          <a:chExt cx="0" cy="0"/>
-        </a:xfrm>
-      </p:grpSpPr>
-      <p:pic>
-        <p:nvPicPr>
-          <p:cNvPr id="5" name="Picture 4">
-            <a:extLst>
-              <a:ext uri="{FF2B5EF4-FFF2-40B4-BE49-F238E27FC236}">
-                <a16:creationId xmlns:a16="http://schemas.microsoft.com/office/drawing/2014/main" id="{D8C577FF-166F-7149-A479-AD50D43DF893}"/>
-              </a:ext>
-            </a:extLst>
-          </p:cNvPr>
-          <p:cNvPicPr>
-            <a:picLocks noChangeAspect="1"/>
-          </p:cNvPicPr>
-          <p:nvPr/>
-        </p:nvPicPr>
-        <p:blipFill>
-          <a:blip r:embed="rId2"/>
-          <a:stretch>
-            <a:fillRect/>
-          </a:stretch>
-        </p:blipFill>
-        <p:spPr>
-          <a:xfrm>
-            <a:off x="-4301601" y="123568"/>
-            <a:ext cx="20484245" cy="6512009"/>
-          </a:xfrm>
-          <a:prstGeom prst="rect">
-            <a:avLst/>
-          </a:prstGeom>
-        </p:spPr>
-      </p:pic>
-    </p:spTree>
-    <p:extLst>
-      <p:ext uri="{BB962C8B-B14F-4D97-AF65-F5344CB8AC3E}">
-        <p14:creationId xmlns:p14="http://schemas.microsoft.com/office/powerpoint/2010/main" val="1338589155"/>
       </p:ext>
     </p:extLst>
   </p:cSld>

</xml_diff>